<commit_message>
techkom done, modbus almoist
</commit_message>
<xml_diff>
--- a/docs/abbildungen/20160307_Vorlage.pptx
+++ b/docs/abbildungen/20160307_Vorlage.pptx
@@ -200,7 +200,7 @@
           <a:p>
             <a:fld id="{5753CF93-5E45-3941-8549-3B143DEE3F14}" type="datetimeFigureOut">
               <a:rPr lang="de-DE" smtClean="0"/>
-              <a:t>18.03.16</a:t>
+              <a:t>19.03.16</a:t>
             </a:fld>
             <a:endParaRPr lang="de-DE"/>
           </a:p>
@@ -414,7 +414,7 @@
           <a:p>
             <a:fld id="{CAD28D52-5B67-8840-9FB3-766E3199C55A}" type="datetimeFigureOut">
               <a:rPr lang="de-DE" smtClean="0"/>
-              <a:t>18.03.16</a:t>
+              <a:t>19.03.16</a:t>
             </a:fld>
             <a:endParaRPr lang="de-DE"/>
           </a:p>
@@ -584,7 +584,7 @@
           <a:p>
             <a:fld id="{CAD28D52-5B67-8840-9FB3-766E3199C55A}" type="datetimeFigureOut">
               <a:rPr lang="de-DE" smtClean="0"/>
-              <a:t>18.03.16</a:t>
+              <a:t>19.03.16</a:t>
             </a:fld>
             <a:endParaRPr lang="de-DE"/>
           </a:p>
@@ -764,7 +764,7 @@
           <a:p>
             <a:fld id="{CAD28D52-5B67-8840-9FB3-766E3199C55A}" type="datetimeFigureOut">
               <a:rPr lang="de-DE" smtClean="0"/>
-              <a:t>18.03.16</a:t>
+              <a:t>19.03.16</a:t>
             </a:fld>
             <a:endParaRPr lang="de-DE"/>
           </a:p>
@@ -934,7 +934,7 @@
           <a:p>
             <a:fld id="{CAD28D52-5B67-8840-9FB3-766E3199C55A}" type="datetimeFigureOut">
               <a:rPr lang="de-DE" smtClean="0"/>
-              <a:t>18.03.16</a:t>
+              <a:t>19.03.16</a:t>
             </a:fld>
             <a:endParaRPr lang="de-DE"/>
           </a:p>
@@ -1180,7 +1180,7 @@
           <a:p>
             <a:fld id="{CAD28D52-5B67-8840-9FB3-766E3199C55A}" type="datetimeFigureOut">
               <a:rPr lang="de-DE" smtClean="0"/>
-              <a:t>18.03.16</a:t>
+              <a:t>19.03.16</a:t>
             </a:fld>
             <a:endParaRPr lang="de-DE"/>
           </a:p>
@@ -1412,7 +1412,7 @@
           <a:p>
             <a:fld id="{CAD28D52-5B67-8840-9FB3-766E3199C55A}" type="datetimeFigureOut">
               <a:rPr lang="de-DE" smtClean="0"/>
-              <a:t>18.03.16</a:t>
+              <a:t>19.03.16</a:t>
             </a:fld>
             <a:endParaRPr lang="de-DE"/>
           </a:p>
@@ -1779,7 +1779,7 @@
           <a:p>
             <a:fld id="{CAD28D52-5B67-8840-9FB3-766E3199C55A}" type="datetimeFigureOut">
               <a:rPr lang="de-DE" smtClean="0"/>
-              <a:t>18.03.16</a:t>
+              <a:t>19.03.16</a:t>
             </a:fld>
             <a:endParaRPr lang="de-DE"/>
           </a:p>
@@ -1897,7 +1897,7 @@
           <a:p>
             <a:fld id="{CAD28D52-5B67-8840-9FB3-766E3199C55A}" type="datetimeFigureOut">
               <a:rPr lang="de-DE" smtClean="0"/>
-              <a:t>18.03.16</a:t>
+              <a:t>19.03.16</a:t>
             </a:fld>
             <a:endParaRPr lang="de-DE"/>
           </a:p>
@@ -1992,7 +1992,7 @@
           <a:p>
             <a:fld id="{CAD28D52-5B67-8840-9FB3-766E3199C55A}" type="datetimeFigureOut">
               <a:rPr lang="de-DE" smtClean="0"/>
-              <a:t>18.03.16</a:t>
+              <a:t>19.03.16</a:t>
             </a:fld>
             <a:endParaRPr lang="de-DE"/>
           </a:p>
@@ -2269,7 +2269,7 @@
           <a:p>
             <a:fld id="{CAD28D52-5B67-8840-9FB3-766E3199C55A}" type="datetimeFigureOut">
               <a:rPr lang="de-DE" smtClean="0"/>
-              <a:t>18.03.16</a:t>
+              <a:t>19.03.16</a:t>
             </a:fld>
             <a:endParaRPr lang="de-DE"/>
           </a:p>
@@ -2522,7 +2522,7 @@
           <a:p>
             <a:fld id="{CAD28D52-5B67-8840-9FB3-766E3199C55A}" type="datetimeFigureOut">
               <a:rPr lang="de-DE" smtClean="0"/>
-              <a:t>18.03.16</a:t>
+              <a:t>19.03.16</a:t>
             </a:fld>
             <a:endParaRPr lang="de-DE"/>
           </a:p>
@@ -2735,7 +2735,7 @@
           <a:p>
             <a:fld id="{CAD28D52-5B67-8840-9FB3-766E3199C55A}" type="datetimeFigureOut">
               <a:rPr lang="de-DE" smtClean="0"/>
-              <a:t>18.03.16</a:t>
+              <a:t>19.03.16</a:t>
             </a:fld>
             <a:endParaRPr lang="de-DE"/>
           </a:p>
@@ -3190,159 +3190,6 @@
       </p:sp>
       <p:sp>
         <p:nvSpPr>
-          <p:cNvPr id="5" name="Rechteck 4"/>
-          <p:cNvSpPr/>
-          <p:nvPr/>
-        </p:nvSpPr>
-        <p:spPr>
-          <a:xfrm>
-            <a:off x="4243363" y="0"/>
-            <a:ext cx="3024000" cy="6364285"/>
-          </a:xfrm>
-          <a:prstGeom prst="rect">
-            <a:avLst/>
-          </a:prstGeom>
-          <a:solidFill>
-            <a:schemeClr val="accent3">
-              <a:lumMod val="20000"/>
-              <a:lumOff val="80000"/>
-            </a:schemeClr>
-          </a:solidFill>
-          <a:ln>
-            <a:solidFill>
-              <a:schemeClr val="tx1"/>
-            </a:solidFill>
-          </a:ln>
-        </p:spPr>
-        <p:style>
-          <a:lnRef idx="2">
-            <a:schemeClr val="accent1">
-              <a:shade val="50000"/>
-            </a:schemeClr>
-          </a:lnRef>
-          <a:fillRef idx="1">
-            <a:schemeClr val="accent1"/>
-          </a:fillRef>
-          <a:effectRef idx="0">
-            <a:schemeClr val="accent1"/>
-          </a:effectRef>
-          <a:fontRef idx="minor">
-            <a:schemeClr val="lt1"/>
-          </a:fontRef>
-        </p:style>
-        <p:txBody>
-          <a:bodyPr rtlCol="0" anchor="ctr"/>
-          <a:lstStyle/>
-          <a:p>
-            <a:pPr algn="ctr"/>
-            <a:endParaRPr lang="de-DE"/>
-          </a:p>
-        </p:txBody>
-      </p:sp>
-      <p:sp>
-        <p:nvSpPr>
-          <p:cNvPr id="6" name="Rechteck 5"/>
-          <p:cNvSpPr/>
-          <p:nvPr/>
-        </p:nvSpPr>
-        <p:spPr>
-          <a:xfrm>
-            <a:off x="1255363" y="-2"/>
-            <a:ext cx="2988000" cy="6364285"/>
-          </a:xfrm>
-          <a:prstGeom prst="rect">
-            <a:avLst/>
-          </a:prstGeom>
-          <a:solidFill>
-            <a:schemeClr val="accent1">
-              <a:lumMod val="20000"/>
-              <a:lumOff val="80000"/>
-            </a:schemeClr>
-          </a:solidFill>
-          <a:ln>
-            <a:solidFill>
-              <a:schemeClr val="tx1"/>
-            </a:solidFill>
-          </a:ln>
-        </p:spPr>
-        <p:style>
-          <a:lnRef idx="2">
-            <a:schemeClr val="accent1">
-              <a:shade val="50000"/>
-            </a:schemeClr>
-          </a:lnRef>
-          <a:fillRef idx="1">
-            <a:schemeClr val="accent1"/>
-          </a:fillRef>
-          <a:effectRef idx="0">
-            <a:schemeClr val="accent1"/>
-          </a:effectRef>
-          <a:fontRef idx="minor">
-            <a:schemeClr val="lt1"/>
-          </a:fontRef>
-        </p:style>
-        <p:txBody>
-          <a:bodyPr rtlCol="0" anchor="ctr"/>
-          <a:lstStyle/>
-          <a:p>
-            <a:pPr algn="ctr"/>
-            <a:endParaRPr lang="de-DE"/>
-          </a:p>
-        </p:txBody>
-      </p:sp>
-      <p:sp>
-        <p:nvSpPr>
-          <p:cNvPr id="7" name="Rechteck 6"/>
-          <p:cNvSpPr/>
-          <p:nvPr/>
-        </p:nvSpPr>
-        <p:spPr>
-          <a:xfrm>
-            <a:off x="7267363" y="0"/>
-            <a:ext cx="2988000" cy="6364285"/>
-          </a:xfrm>
-          <a:prstGeom prst="rect">
-            <a:avLst/>
-          </a:prstGeom>
-          <a:solidFill>
-            <a:schemeClr val="accent6">
-              <a:lumMod val="20000"/>
-              <a:lumOff val="80000"/>
-            </a:schemeClr>
-          </a:solidFill>
-          <a:ln>
-            <a:solidFill>
-              <a:schemeClr val="tx1"/>
-            </a:solidFill>
-          </a:ln>
-        </p:spPr>
-        <p:style>
-          <a:lnRef idx="2">
-            <a:schemeClr val="accent1">
-              <a:shade val="50000"/>
-            </a:schemeClr>
-          </a:lnRef>
-          <a:fillRef idx="1">
-            <a:schemeClr val="accent1"/>
-          </a:fillRef>
-          <a:effectRef idx="0">
-            <a:schemeClr val="accent1"/>
-          </a:effectRef>
-          <a:fontRef idx="minor">
-            <a:schemeClr val="lt1"/>
-          </a:fontRef>
-        </p:style>
-        <p:txBody>
-          <a:bodyPr rtlCol="0" anchor="ctr"/>
-          <a:lstStyle/>
-          <a:p>
-            <a:pPr algn="ctr"/>
-            <a:endParaRPr lang="de-DE"/>
-          </a:p>
-        </p:txBody>
-      </p:sp>
-      <p:sp>
-        <p:nvSpPr>
           <p:cNvPr id="12" name="Rechteck 11"/>
           <p:cNvSpPr/>
           <p:nvPr/>
@@ -3386,237 +3233,6 @@
           <a:p>
             <a:pPr algn="ctr"/>
             <a:endParaRPr lang="de-DE"/>
-          </a:p>
-        </p:txBody>
-      </p:sp>
-      <p:sp>
-        <p:nvSpPr>
-          <p:cNvPr id="2" name="Oval 1"/>
-          <p:cNvSpPr>
-            <a:spLocks noChangeAspect="1"/>
-          </p:cNvSpPr>
-          <p:nvPr/>
-        </p:nvSpPr>
-        <p:spPr>
-          <a:xfrm>
-            <a:off x="-188888" y="1689281"/>
-            <a:ext cx="972000" cy="972000"/>
-          </a:xfrm>
-          <a:prstGeom prst="ellipse">
-            <a:avLst/>
-          </a:prstGeom>
-          <a:noFill/>
-          <a:ln w="38100">
-            <a:solidFill>
-              <a:schemeClr val="tx1"/>
-            </a:solidFill>
-          </a:ln>
-        </p:spPr>
-        <p:style>
-          <a:lnRef idx="2">
-            <a:schemeClr val="accent1">
-              <a:shade val="50000"/>
-            </a:schemeClr>
-          </a:lnRef>
-          <a:fillRef idx="1">
-            <a:schemeClr val="accent1"/>
-          </a:fillRef>
-          <a:effectRef idx="0">
-            <a:schemeClr val="accent1"/>
-          </a:effectRef>
-          <a:fontRef idx="minor">
-            <a:schemeClr val="lt1"/>
-          </a:fontRef>
-        </p:style>
-        <p:txBody>
-          <a:bodyPr rtlCol="0" anchor="ctr"/>
-          <a:lstStyle/>
-          <a:p>
-            <a:pPr algn="ctr"/>
-            <a:endParaRPr lang="de-DE"/>
-          </a:p>
-        </p:txBody>
-      </p:sp>
-      <p:cxnSp>
-        <p:nvCxnSpPr>
-          <p:cNvPr id="8" name="Gerade Verbindung 7"/>
-          <p:cNvCxnSpPr>
-            <a:stCxn id="2" idx="4"/>
-          </p:cNvCxnSpPr>
-          <p:nvPr/>
-        </p:nvCxnSpPr>
-        <p:spPr>
-          <a:xfrm>
-            <a:off x="297112" y="2661281"/>
-            <a:ext cx="0" cy="576000"/>
-          </a:xfrm>
-          <a:prstGeom prst="line">
-            <a:avLst/>
-          </a:prstGeom>
-          <a:noFill/>
-          <a:ln w="38100">
-            <a:solidFill>
-              <a:schemeClr val="tx1"/>
-            </a:solidFill>
-          </a:ln>
-        </p:spPr>
-        <p:style>
-          <a:lnRef idx="2">
-            <a:schemeClr val="accent1">
-              <a:shade val="50000"/>
-            </a:schemeClr>
-          </a:lnRef>
-          <a:fillRef idx="1">
-            <a:schemeClr val="accent1"/>
-          </a:fillRef>
-          <a:effectRef idx="0">
-            <a:schemeClr val="accent1"/>
-          </a:effectRef>
-          <a:fontRef idx="minor">
-            <a:schemeClr val="lt1"/>
-          </a:fontRef>
-        </p:style>
-      </p:cxnSp>
-      <p:cxnSp>
-        <p:nvCxnSpPr>
-          <p:cNvPr id="10" name="Gerade Verbindung 9"/>
-          <p:cNvCxnSpPr/>
-          <p:nvPr/>
-        </p:nvCxnSpPr>
-        <p:spPr>
-          <a:xfrm>
-            <a:off x="297112" y="1887281"/>
-            <a:ext cx="0" cy="576000"/>
-          </a:xfrm>
-          <a:prstGeom prst="line">
-            <a:avLst/>
-          </a:prstGeom>
-          <a:noFill/>
-          <a:ln w="38100">
-            <a:solidFill>
-              <a:schemeClr val="tx1"/>
-            </a:solidFill>
-            <a:headEnd type="none"/>
-            <a:tailEnd type="oval" w="lg" len="lg"/>
-          </a:ln>
-        </p:spPr>
-        <p:style>
-          <a:lnRef idx="2">
-            <a:schemeClr val="accent1">
-              <a:shade val="50000"/>
-            </a:schemeClr>
-          </a:lnRef>
-          <a:fillRef idx="1">
-            <a:schemeClr val="accent1"/>
-          </a:fillRef>
-          <a:effectRef idx="0">
-            <a:schemeClr val="accent1"/>
-          </a:effectRef>
-          <a:fontRef idx="minor">
-            <a:schemeClr val="lt1"/>
-          </a:fontRef>
-        </p:style>
-      </p:cxnSp>
-      <p:sp>
-        <p:nvSpPr>
-          <p:cNvPr id="14" name="Oval 13"/>
-          <p:cNvSpPr>
-            <a:spLocks noChangeAspect="1"/>
-          </p:cNvSpPr>
-          <p:nvPr/>
-        </p:nvSpPr>
-        <p:spPr>
-          <a:xfrm>
-            <a:off x="-188888" y="4084819"/>
-            <a:ext cx="972000" cy="972000"/>
-          </a:xfrm>
-          <a:prstGeom prst="ellipse">
-            <a:avLst/>
-          </a:prstGeom>
-          <a:noFill/>
-          <a:ln w="38100">
-            <a:solidFill>
-              <a:schemeClr val="tx1"/>
-            </a:solidFill>
-          </a:ln>
-        </p:spPr>
-        <p:style>
-          <a:lnRef idx="2">
-            <a:schemeClr val="accent1">
-              <a:shade val="50000"/>
-            </a:schemeClr>
-          </a:lnRef>
-          <a:fillRef idx="1">
-            <a:schemeClr val="accent1"/>
-          </a:fillRef>
-          <a:effectRef idx="0">
-            <a:schemeClr val="accent1"/>
-          </a:effectRef>
-          <a:fontRef idx="minor">
-            <a:schemeClr val="lt1"/>
-          </a:fontRef>
-        </p:style>
-        <p:txBody>
-          <a:bodyPr rtlCol="0" anchor="ctr"/>
-          <a:lstStyle/>
-          <a:p>
-            <a:pPr algn="ctr"/>
-            <a:endParaRPr lang="de-DE"/>
-          </a:p>
-        </p:txBody>
-      </p:sp>
-      <p:sp>
-        <p:nvSpPr>
-          <p:cNvPr id="15" name="Bogen 14"/>
-          <p:cNvSpPr>
-            <a:spLocks noChangeAspect="1"/>
-          </p:cNvSpPr>
-          <p:nvPr/>
-        </p:nvSpPr>
-        <p:spPr>
-          <a:xfrm>
-            <a:off x="-187995" y="4756559"/>
-            <a:ext cx="971107" cy="972000"/>
-          </a:xfrm>
-          <a:prstGeom prst="arc">
-            <a:avLst>
-              <a:gd name="adj1" fmla="val 12721934"/>
-              <a:gd name="adj2" fmla="val 20053122"/>
-            </a:avLst>
-          </a:prstGeom>
-          <a:noFill/>
-          <a:ln w="38100">
-            <a:solidFill>
-              <a:schemeClr val="tx1"/>
-            </a:solidFill>
-          </a:ln>
-        </p:spPr>
-        <p:style>
-          <a:lnRef idx="2">
-            <a:schemeClr val="accent1">
-              <a:shade val="50000"/>
-            </a:schemeClr>
-          </a:lnRef>
-          <a:fillRef idx="1">
-            <a:schemeClr val="accent1"/>
-          </a:fillRef>
-          <a:effectRef idx="0">
-            <a:schemeClr val="accent1"/>
-          </a:effectRef>
-          <a:fontRef idx="minor">
-            <a:schemeClr val="lt1"/>
-          </a:fontRef>
-        </p:style>
-        <p:txBody>
-          <a:bodyPr rtlCol="0" anchor="ctr"/>
-          <a:lstStyle/>
-          <a:p>
-            <a:pPr algn="ctr"/>
-            <a:endParaRPr lang="de-DE">
-              <a:solidFill>
-                <a:schemeClr val="lt1"/>
-              </a:solidFill>
-            </a:endParaRPr>
           </a:p>
         </p:txBody>
       </p:sp>

</xml_diff>